<commit_message>
Added some comments on the slides
</commit_message>
<xml_diff>
--- a/slides/slides_gpu_Matrix_Multiplication.pptx
+++ b/slides/slides_gpu_Matrix_Multiplication.pptx
@@ -124,12 +124,47 @@
 </p:presentation>
 </file>
 
+<file path=ppt/commentAuthors.xml><?xml version="1.0" encoding="utf-8"?>
+<p:cmAuthorLst xmlns:a="http://schemas.openxmlformats.org/drawingml/2006/main" xmlns:r="http://schemas.openxmlformats.org/officeDocument/2006/relationships" xmlns:p="http://schemas.openxmlformats.org/presentationml/2006/main">
+  <p:cmAuthor id="1" name="Rubén Martín" initials="RM" lastIdx="2" clrIdx="0">
+    <p:extLst>
+      <p:ext uri="{19B8F6BF-5375-455C-9EA6-DF929625EA0E}">
+        <p15:presenceInfo xmlns:p15="http://schemas.microsoft.com/office/powerpoint/2012/main" userId="7cfa1867aa0efb19" providerId="Windows Live"/>
+      </p:ext>
+    </p:extLst>
+  </p:cmAuthor>
+</p:cmAuthorLst>
+</file>
+
 <file path=ppt/revisionInfo.xml><?xml version="1.0" encoding="utf-8"?>
 <p1510:revInfo xmlns:a="http://schemas.openxmlformats.org/drawingml/2006/main" xmlns:r="http://schemas.openxmlformats.org/officeDocument/2006/relationships" xmlns:p1510="http://schemas.microsoft.com/office/powerpoint/2015/10/main">
   <p1510:revLst>
     <p1510:client id="{C352515D-72C2-473A-9296-B252BB30E7C0}" v="17" dt="2020-09-15T18:33:29.844"/>
   </p1510:revLst>
 </p1510:revInfo>
+</file>
+
+<file path=ppt/comments/comment1.xml><?xml version="1.0" encoding="utf-8"?>
+<p:cmLst xmlns:a="http://schemas.openxmlformats.org/drawingml/2006/main" xmlns:r="http://schemas.openxmlformats.org/officeDocument/2006/relationships" xmlns:p="http://schemas.openxmlformats.org/presentationml/2006/main">
+  <p:cm authorId="1" dt="2020-09-24T13:44:37.498" idx="1">
+    <p:pos x="2849" y="251"/>
+    <p:text>I would start with this and next two slides.</p:text>
+    <p:extLst>
+      <p:ext uri="{C676402C-5697-4E1C-873F-D02D1690AC5C}">
+        <p15:threadingInfo xmlns:p15="http://schemas.microsoft.com/office/powerpoint/2012/main" timeZoneBias="-120"/>
+      </p:ext>
+    </p:extLst>
+  </p:cm>
+  <p:cm authorId="1" dt="2020-09-24T13:45:26.157" idx="2">
+    <p:pos x="3813" y="269"/>
+    <p:text>I would also refresh the concept of Kernel befor using it here.</p:text>
+    <p:extLst>
+      <p:ext uri="{C676402C-5697-4E1C-873F-D02D1690AC5C}">
+        <p15:threadingInfo xmlns:p15="http://schemas.microsoft.com/office/powerpoint/2012/main" timeZoneBias="-120"/>
+      </p:ext>
+    </p:extLst>
+  </p:cm>
+</p:cmLst>
 </file>
 
 <file path=ppt/notesMasters/notesMaster1.xml><?xml version="1.0" encoding="utf-8"?>
@@ -214,7 +249,7 @@
           <a:p>
             <a:fld id="{203BCAD3-DEE0-4A52-BAA7-367ADE365FCC}" type="datetimeFigureOut">
               <a:rPr lang="en-US" smtClean="0"/>
-              <a:t>9/15/2020</a:t>
+              <a:t>9/24/2020</a:t>
             </a:fld>
             <a:endParaRPr lang="en-US"/>
           </a:p>
@@ -372,7 +407,7 @@
           <a:p>
             <a:fld id="{C682BD07-5C84-45AF-B88C-7EBFB7C3B6BF}" type="slidenum">
               <a:rPr lang="en-US" smtClean="0"/>
-              <a:t>‹#›</a:t>
+              <a:t>‹Nº›</a:t>
             </a:fld>
             <a:endParaRPr lang="en-US"/>
           </a:p>
@@ -532,7 +567,7 @@
               </a:spcAft>
               <a:buNone/>
             </a:pPr>
-            <a:endParaRPr/>
+            <a:endParaRPr dirty="0"/>
           </a:p>
         </p:txBody>
       </p:sp>
@@ -1064,7 +1099,7 @@
           <a:p>
             <a:fld id="{866D0EA9-75B6-4DD6-8049-C9004FBFE56A}" type="datetimeFigureOut">
               <a:rPr lang="en-US" smtClean="0"/>
-              <a:t>9/15/2020</a:t>
+              <a:t>9/24/2020</a:t>
             </a:fld>
             <a:endParaRPr lang="en-US"/>
           </a:p>
@@ -1118,7 +1153,7 @@
           <a:p>
             <a:fld id="{AD095564-349D-4FF9-B3DA-E000FB878BE6}" type="slidenum">
               <a:rPr lang="en-US" smtClean="0"/>
-              <a:t>‹#›</a:t>
+              <a:t>‹Nº›</a:t>
             </a:fld>
             <a:endParaRPr lang="en-US"/>
           </a:p>
@@ -1262,7 +1297,7 @@
           <a:p>
             <a:fld id="{866D0EA9-75B6-4DD6-8049-C9004FBFE56A}" type="datetimeFigureOut">
               <a:rPr lang="en-US" smtClean="0"/>
-              <a:t>9/15/2020</a:t>
+              <a:t>9/24/2020</a:t>
             </a:fld>
             <a:endParaRPr lang="en-US"/>
           </a:p>
@@ -1316,7 +1351,7 @@
           <a:p>
             <a:fld id="{AD095564-349D-4FF9-B3DA-E000FB878BE6}" type="slidenum">
               <a:rPr lang="en-US" smtClean="0"/>
-              <a:t>‹#›</a:t>
+              <a:t>‹Nº›</a:t>
             </a:fld>
             <a:endParaRPr lang="en-US"/>
           </a:p>
@@ -1470,7 +1505,7 @@
           <a:p>
             <a:fld id="{866D0EA9-75B6-4DD6-8049-C9004FBFE56A}" type="datetimeFigureOut">
               <a:rPr lang="en-US" smtClean="0"/>
-              <a:t>9/15/2020</a:t>
+              <a:t>9/24/2020</a:t>
             </a:fld>
             <a:endParaRPr lang="en-US"/>
           </a:p>
@@ -1524,7 +1559,7 @@
           <a:p>
             <a:fld id="{AD095564-349D-4FF9-B3DA-E000FB878BE6}" type="slidenum">
               <a:rPr lang="en-US" smtClean="0"/>
-              <a:t>‹#›</a:t>
+              <a:t>‹Nº›</a:t>
             </a:fld>
             <a:endParaRPr lang="en-US"/>
           </a:p>
@@ -1668,7 +1703,7 @@
           <a:p>
             <a:fld id="{866D0EA9-75B6-4DD6-8049-C9004FBFE56A}" type="datetimeFigureOut">
               <a:rPr lang="en-US" smtClean="0"/>
-              <a:t>9/15/2020</a:t>
+              <a:t>9/24/2020</a:t>
             </a:fld>
             <a:endParaRPr lang="en-US"/>
           </a:p>
@@ -1722,7 +1757,7 @@
           <a:p>
             <a:fld id="{AD095564-349D-4FF9-B3DA-E000FB878BE6}" type="slidenum">
               <a:rPr lang="en-US" smtClean="0"/>
-              <a:t>‹#›</a:t>
+              <a:t>‹Nº›</a:t>
             </a:fld>
             <a:endParaRPr lang="en-US"/>
           </a:p>
@@ -1943,7 +1978,7 @@
           <a:p>
             <a:fld id="{866D0EA9-75B6-4DD6-8049-C9004FBFE56A}" type="datetimeFigureOut">
               <a:rPr lang="en-US" smtClean="0"/>
-              <a:t>9/15/2020</a:t>
+              <a:t>9/24/2020</a:t>
             </a:fld>
             <a:endParaRPr lang="en-US"/>
           </a:p>
@@ -1997,7 +2032,7 @@
           <a:p>
             <a:fld id="{AD095564-349D-4FF9-B3DA-E000FB878BE6}" type="slidenum">
               <a:rPr lang="en-US" smtClean="0"/>
-              <a:t>‹#›</a:t>
+              <a:t>‹Nº›</a:t>
             </a:fld>
             <a:endParaRPr lang="en-US"/>
           </a:p>
@@ -2208,7 +2243,7 @@
           <a:p>
             <a:fld id="{866D0EA9-75B6-4DD6-8049-C9004FBFE56A}" type="datetimeFigureOut">
               <a:rPr lang="en-US" smtClean="0"/>
-              <a:t>9/15/2020</a:t>
+              <a:t>9/24/2020</a:t>
             </a:fld>
             <a:endParaRPr lang="en-US"/>
           </a:p>
@@ -2262,7 +2297,7 @@
           <a:p>
             <a:fld id="{AD095564-349D-4FF9-B3DA-E000FB878BE6}" type="slidenum">
               <a:rPr lang="en-US" smtClean="0"/>
-              <a:t>‹#›</a:t>
+              <a:t>‹Nº›</a:t>
             </a:fld>
             <a:endParaRPr lang="en-US"/>
           </a:p>
@@ -2620,7 +2655,7 @@
           <a:p>
             <a:fld id="{866D0EA9-75B6-4DD6-8049-C9004FBFE56A}" type="datetimeFigureOut">
               <a:rPr lang="en-US" smtClean="0"/>
-              <a:t>9/15/2020</a:t>
+              <a:t>9/24/2020</a:t>
             </a:fld>
             <a:endParaRPr lang="en-US"/>
           </a:p>
@@ -2674,7 +2709,7 @@
           <a:p>
             <a:fld id="{AD095564-349D-4FF9-B3DA-E000FB878BE6}" type="slidenum">
               <a:rPr lang="en-US" smtClean="0"/>
-              <a:t>‹#›</a:t>
+              <a:t>‹Nº›</a:t>
             </a:fld>
             <a:endParaRPr lang="en-US"/>
           </a:p>
@@ -2761,7 +2796,7 @@
           <a:p>
             <a:fld id="{866D0EA9-75B6-4DD6-8049-C9004FBFE56A}" type="datetimeFigureOut">
               <a:rPr lang="en-US" smtClean="0"/>
-              <a:t>9/15/2020</a:t>
+              <a:t>9/24/2020</a:t>
             </a:fld>
             <a:endParaRPr lang="en-US"/>
           </a:p>
@@ -2815,7 +2850,7 @@
           <a:p>
             <a:fld id="{AD095564-349D-4FF9-B3DA-E000FB878BE6}" type="slidenum">
               <a:rPr lang="en-US" smtClean="0"/>
-              <a:t>‹#›</a:t>
+              <a:t>‹Nº›</a:t>
             </a:fld>
             <a:endParaRPr lang="en-US"/>
           </a:p>
@@ -2874,7 +2909,7 @@
           <a:p>
             <a:fld id="{866D0EA9-75B6-4DD6-8049-C9004FBFE56A}" type="datetimeFigureOut">
               <a:rPr lang="en-US" smtClean="0"/>
-              <a:t>9/15/2020</a:t>
+              <a:t>9/24/2020</a:t>
             </a:fld>
             <a:endParaRPr lang="en-US"/>
           </a:p>
@@ -2928,7 +2963,7 @@
           <a:p>
             <a:fld id="{AD095564-349D-4FF9-B3DA-E000FB878BE6}" type="slidenum">
               <a:rPr lang="en-US" smtClean="0"/>
-              <a:t>‹#›</a:t>
+              <a:t>‹Nº›</a:t>
             </a:fld>
             <a:endParaRPr lang="en-US"/>
           </a:p>
@@ -3185,7 +3220,7 @@
           <a:p>
             <a:fld id="{866D0EA9-75B6-4DD6-8049-C9004FBFE56A}" type="datetimeFigureOut">
               <a:rPr lang="en-US" smtClean="0"/>
-              <a:t>9/15/2020</a:t>
+              <a:t>9/24/2020</a:t>
             </a:fld>
             <a:endParaRPr lang="en-US"/>
           </a:p>
@@ -3239,7 +3274,7 @@
           <a:p>
             <a:fld id="{AD095564-349D-4FF9-B3DA-E000FB878BE6}" type="slidenum">
               <a:rPr lang="en-US" smtClean="0"/>
-              <a:t>‹#›</a:t>
+              <a:t>‹Nº›</a:t>
             </a:fld>
             <a:endParaRPr lang="en-US"/>
           </a:p>
@@ -3473,7 +3508,7 @@
           <a:p>
             <a:fld id="{866D0EA9-75B6-4DD6-8049-C9004FBFE56A}" type="datetimeFigureOut">
               <a:rPr lang="en-US" smtClean="0"/>
-              <a:t>9/15/2020</a:t>
+              <a:t>9/24/2020</a:t>
             </a:fld>
             <a:endParaRPr lang="en-US"/>
           </a:p>
@@ -3527,7 +3562,7 @@
           <a:p>
             <a:fld id="{AD095564-349D-4FF9-B3DA-E000FB878BE6}" type="slidenum">
               <a:rPr lang="en-US" smtClean="0"/>
-              <a:t>‹#›</a:t>
+              <a:t>‹Nº›</a:t>
             </a:fld>
             <a:endParaRPr lang="en-US"/>
           </a:p>
@@ -3714,7 +3749,7 @@
           <a:p>
             <a:fld id="{866D0EA9-75B6-4DD6-8049-C9004FBFE56A}" type="datetimeFigureOut">
               <a:rPr lang="en-US" smtClean="0"/>
-              <a:t>9/15/2020</a:t>
+              <a:t>9/24/2020</a:t>
             </a:fld>
             <a:endParaRPr lang="en-US"/>
           </a:p>
@@ -3804,7 +3839,7 @@
           <a:p>
             <a:fld id="{AD095564-349D-4FF9-B3DA-E000FB878BE6}" type="slidenum">
               <a:rPr lang="en-US" smtClean="0"/>
-              <a:t>‹#›</a:t>
+              <a:t>‹Nº›</a:t>
             </a:fld>
             <a:endParaRPr lang="en-US"/>
           </a:p>

</xml_diff>